<commit_message>
#44 revert test change to ppt
</commit_message>
<xml_diff>
--- a/examples/powerpoint/slides.pptx
+++ b/examples/powerpoint/slides.pptx
@@ -6,7 +6,6 @@
   </p:sldMasterIdLst>
   <p:sldIdLst>
     <p:sldId id="256" r:id="rId2"/>
-    <p:sldId id="257" r:id="rId3"/>
   </p:sldIdLst>
   <p:sldSz cx="12192000" cy="6858000"/>
   <p:notesSz cx="6858000" cy="9144000"/>
@@ -105,11 +104,6 @@
       </a:defRPr>
     </a:lvl9pPr>
   </p:defaultTextStyle>
-  <p:extLst>
-    <p:ext uri="{EFAFB233-063F-42B5-8137-9DF3F51BA10A}">
-      <p15:sldGuideLst xmlns:p15="http://schemas.microsoft.com/office/powerpoint/2012/main"/>
-    </p:ext>
-  </p:extLst>
 </p:presentation>
 </file>
 
@@ -260,7 +254,7 @@
           <a:p>
             <a:fld id="{CC352822-AD16-A040-9B85-AE84E57D2BBC}" type="datetimeFigureOut">
               <a:rPr lang="en-US" smtClean="0"/>
-              <a:t>5/9/25</a:t>
+              <a:t>3/22/24</a:t>
             </a:fld>
             <a:endParaRPr lang="en-US"/>
           </a:p>
@@ -458,7 +452,7 @@
           <a:p>
             <a:fld id="{CC352822-AD16-A040-9B85-AE84E57D2BBC}" type="datetimeFigureOut">
               <a:rPr lang="en-US" smtClean="0"/>
-              <a:t>5/9/25</a:t>
+              <a:t>3/22/24</a:t>
             </a:fld>
             <a:endParaRPr lang="en-US"/>
           </a:p>
@@ -666,7 +660,7 @@
           <a:p>
             <a:fld id="{CC352822-AD16-A040-9B85-AE84E57D2BBC}" type="datetimeFigureOut">
               <a:rPr lang="en-US" smtClean="0"/>
-              <a:t>5/9/25</a:t>
+              <a:t>3/22/24</a:t>
             </a:fld>
             <a:endParaRPr lang="en-US"/>
           </a:p>
@@ -864,7 +858,7 @@
           <a:p>
             <a:fld id="{CC352822-AD16-A040-9B85-AE84E57D2BBC}" type="datetimeFigureOut">
               <a:rPr lang="en-US" smtClean="0"/>
-              <a:t>5/9/25</a:t>
+              <a:t>3/22/24</a:t>
             </a:fld>
             <a:endParaRPr lang="en-US"/>
           </a:p>
@@ -1139,7 +1133,7 @@
           <a:p>
             <a:fld id="{CC352822-AD16-A040-9B85-AE84E57D2BBC}" type="datetimeFigureOut">
               <a:rPr lang="en-US" smtClean="0"/>
-              <a:t>5/9/25</a:t>
+              <a:t>3/22/24</a:t>
             </a:fld>
             <a:endParaRPr lang="en-US"/>
           </a:p>
@@ -1404,7 +1398,7 @@
           <a:p>
             <a:fld id="{CC352822-AD16-A040-9B85-AE84E57D2BBC}" type="datetimeFigureOut">
               <a:rPr lang="en-US" smtClean="0"/>
-              <a:t>5/9/25</a:t>
+              <a:t>3/22/24</a:t>
             </a:fld>
             <a:endParaRPr lang="en-US"/>
           </a:p>
@@ -1816,7 +1810,7 @@
           <a:p>
             <a:fld id="{CC352822-AD16-A040-9B85-AE84E57D2BBC}" type="datetimeFigureOut">
               <a:rPr lang="en-US" smtClean="0"/>
-              <a:t>5/9/25</a:t>
+              <a:t>3/22/24</a:t>
             </a:fld>
             <a:endParaRPr lang="en-US"/>
           </a:p>
@@ -1957,7 +1951,7 @@
           <a:p>
             <a:fld id="{CC352822-AD16-A040-9B85-AE84E57D2BBC}" type="datetimeFigureOut">
               <a:rPr lang="en-US" smtClean="0"/>
-              <a:t>5/9/25</a:t>
+              <a:t>3/22/24</a:t>
             </a:fld>
             <a:endParaRPr lang="en-US"/>
           </a:p>
@@ -2070,7 +2064,7 @@
           <a:p>
             <a:fld id="{CC352822-AD16-A040-9B85-AE84E57D2BBC}" type="datetimeFigureOut">
               <a:rPr lang="en-US" smtClean="0"/>
-              <a:t>5/9/25</a:t>
+              <a:t>3/22/24</a:t>
             </a:fld>
             <a:endParaRPr lang="en-US"/>
           </a:p>
@@ -2381,7 +2375,7 @@
           <a:p>
             <a:fld id="{CC352822-AD16-A040-9B85-AE84E57D2BBC}" type="datetimeFigureOut">
               <a:rPr lang="en-US" smtClean="0"/>
-              <a:t>5/9/25</a:t>
+              <a:t>3/22/24</a:t>
             </a:fld>
             <a:endParaRPr lang="en-US"/>
           </a:p>
@@ -2669,7 +2663,7 @@
           <a:p>
             <a:fld id="{CC352822-AD16-A040-9B85-AE84E57D2BBC}" type="datetimeFigureOut">
               <a:rPr lang="en-US" smtClean="0"/>
-              <a:t>5/9/25</a:t>
+              <a:t>3/22/24</a:t>
             </a:fld>
             <a:endParaRPr lang="en-US"/>
           </a:p>
@@ -2910,7 +2904,7 @@
           <a:p>
             <a:fld id="{CC352822-AD16-A040-9B85-AE84E57D2BBC}" type="datetimeFigureOut">
               <a:rPr lang="en-US" smtClean="0"/>
-              <a:t>5/9/25</a:t>
+              <a:t>3/22/24</a:t>
             </a:fld>
             <a:endParaRPr lang="en-US"/>
           </a:p>
@@ -3396,90 +3390,6 @@
 </p:sld>
 </file>
 
-<file path=ppt/slides/slide2.xml><?xml version="1.0" encoding="utf-8"?>
-<p:sld xmlns:a="http://schemas.openxmlformats.org/drawingml/2006/main" xmlns:r="http://schemas.openxmlformats.org/officeDocument/2006/relationships" xmlns:p="http://schemas.openxmlformats.org/presentationml/2006/main">
-  <p:cSld>
-    <p:spTree>
-      <p:nvGrpSpPr>
-        <p:cNvPr id="1" name=""/>
-        <p:cNvGrpSpPr/>
-        <p:nvPr/>
-      </p:nvGrpSpPr>
-      <p:grpSpPr>
-        <a:xfrm>
-          <a:off x="0" y="0"/>
-          <a:ext cx="0" cy="0"/>
-          <a:chOff x="0" y="0"/>
-          <a:chExt cx="0" cy="0"/>
-        </a:xfrm>
-      </p:grpSpPr>
-      <p:sp>
-        <p:nvSpPr>
-          <p:cNvPr id="2" name="Title 1">
-            <a:extLst>
-              <a:ext uri="{FF2B5EF4-FFF2-40B4-BE49-F238E27FC236}">
-                <a16:creationId xmlns:a16="http://schemas.microsoft.com/office/drawing/2014/main" id="{0CA8DC79-61D1-E507-FCEC-9807EF1081C3}"/>
-              </a:ext>
-            </a:extLst>
-          </p:cNvPr>
-          <p:cNvSpPr>
-            <a:spLocks noGrp="1"/>
-          </p:cNvSpPr>
-          <p:nvPr>
-            <p:ph type="title"/>
-          </p:nvPr>
-        </p:nvSpPr>
-        <p:spPr/>
-        <p:txBody>
-          <a:bodyPr/>
-          <a:lstStyle/>
-          <a:p>
-            <a:endParaRPr lang="en-US"/>
-          </a:p>
-        </p:txBody>
-      </p:sp>
-      <p:pic>
-        <p:nvPicPr>
-          <p:cNvPr id="6" name="Content Placeholder 5" descr="A diagram with lines drawn on it&#10;&#10;AI-generated content may be incorrect.">
-            <a:extLst>
-              <a:ext uri="{FF2B5EF4-FFF2-40B4-BE49-F238E27FC236}">
-                <a16:creationId xmlns:a16="http://schemas.microsoft.com/office/drawing/2014/main" id="{BD3C4541-CF38-F1C0-24E2-DFDD5A3A4E2A}"/>
-              </a:ext>
-            </a:extLst>
-          </p:cNvPr>
-          <p:cNvPicPr>
-            <a:picLocks noGrp="1" noChangeAspect="1"/>
-          </p:cNvPicPr>
-          <p:nvPr>
-            <p:ph idx="1"/>
-          </p:nvPr>
-        </p:nvPicPr>
-        <p:blipFill>
-          <a:blip r:link="rId2"/>
-          <a:stretch>
-            <a:fillRect/>
-          </a:stretch>
-        </p:blipFill>
-        <p:spPr>
-          <a:xfrm>
-            <a:off x="2414571" y="1825625"/>
-            <a:ext cx="7362857" cy="4351338"/>
-          </a:xfrm>
-        </p:spPr>
-      </p:pic>
-    </p:spTree>
-    <p:extLst>
-      <p:ext uri="{BB962C8B-B14F-4D97-AF65-F5344CB8AC3E}">
-        <p14:creationId xmlns:p14="http://schemas.microsoft.com/office/powerpoint/2010/main" val="130331591"/>
-      </p:ext>
-    </p:extLst>
-  </p:cSld>
-  <p:clrMapOvr>
-    <a:masterClrMapping/>
-  </p:clrMapOvr>
-</p:sld>
-</file>
-
 <file path=ppt/theme/theme1.xml><?xml version="1.0" encoding="utf-8"?>
 <a:theme xmlns:a="http://schemas.openxmlformats.org/drawingml/2006/main" name="Office Theme">
   <a:themeElements>

</xml_diff>